<commit_message>
update Architecture DBSA document.
</commit_message>
<xml_diff>
--- a/Report/Architecture Data Bibliography Science Articles/Architecture Data Bibliography Science Articles.pptx
+++ b/Report/Architecture Data Bibliography Science Articles/Architecture Data Bibliography Science Articles.pptx
@@ -192,7 +192,8 @@
           <a:p>
             <a:fld id="{F63FD2B4-2956-4F54-868B-DDF4289EA4A7}" type="datetimeFigureOut">
               <a:rPr lang="en-US" smtClean="0"/>
-              <a:t>9/26/2010</a:t>
+              <a:pPr/>
+              <a:t>9/27/2010</a:t>
             </a:fld>
             <a:endParaRPr lang="en-US"/>
           </a:p>
@@ -353,6 +354,7 @@
           <a:p>
             <a:fld id="{1AE67C64-F1EB-4882-BE3D-8CF054CFD4DA}" type="slidenum">
               <a:rPr lang="en-US" smtClean="0"/>
+              <a:pPr/>
               <a:t>‹#›</a:t>
             </a:fld>
             <a:endParaRPr lang="en-US"/>
@@ -639,7 +641,7 @@
             <a:fld id="{1D8BD707-D9CF-40AE-B4C6-C98DA3205C09}" type="datetimeFigureOut">
               <a:rPr lang="en-US" smtClean="0"/>
               <a:pPr/>
-              <a:t>9/26/2010</a:t>
+              <a:t>9/27/2010</a:t>
             </a:fld>
             <a:endParaRPr lang="en-US"/>
           </a:p>
@@ -806,7 +808,7 @@
             <a:fld id="{1D8BD707-D9CF-40AE-B4C6-C98DA3205C09}" type="datetimeFigureOut">
               <a:rPr lang="en-US" smtClean="0"/>
               <a:pPr/>
-              <a:t>9/26/2010</a:t>
+              <a:t>9/27/2010</a:t>
             </a:fld>
             <a:endParaRPr lang="en-US"/>
           </a:p>
@@ -983,7 +985,7 @@
             <a:fld id="{1D8BD707-D9CF-40AE-B4C6-C98DA3205C09}" type="datetimeFigureOut">
               <a:rPr lang="en-US" smtClean="0"/>
               <a:pPr/>
-              <a:t>9/26/2010</a:t>
+              <a:t>9/27/2010</a:t>
             </a:fld>
             <a:endParaRPr lang="en-US"/>
           </a:p>
@@ -1150,7 +1152,7 @@
             <a:fld id="{1D8BD707-D9CF-40AE-B4C6-C98DA3205C09}" type="datetimeFigureOut">
               <a:rPr lang="en-US" smtClean="0"/>
               <a:pPr/>
-              <a:t>9/26/2010</a:t>
+              <a:t>9/27/2010</a:t>
             </a:fld>
             <a:endParaRPr lang="en-US"/>
           </a:p>
@@ -1393,7 +1395,7 @@
             <a:fld id="{1D8BD707-D9CF-40AE-B4C6-C98DA3205C09}" type="datetimeFigureOut">
               <a:rPr lang="en-US" smtClean="0"/>
               <a:pPr/>
-              <a:t>9/26/2010</a:t>
+              <a:t>9/27/2010</a:t>
             </a:fld>
             <a:endParaRPr lang="en-US"/>
           </a:p>
@@ -1678,7 +1680,7 @@
             <a:fld id="{1D8BD707-D9CF-40AE-B4C6-C98DA3205C09}" type="datetimeFigureOut">
               <a:rPr lang="en-US" smtClean="0"/>
               <a:pPr/>
-              <a:t>9/26/2010</a:t>
+              <a:t>9/27/2010</a:t>
             </a:fld>
             <a:endParaRPr lang="en-US"/>
           </a:p>
@@ -2097,7 +2099,7 @@
             <a:fld id="{1D8BD707-D9CF-40AE-B4C6-C98DA3205C09}" type="datetimeFigureOut">
               <a:rPr lang="en-US" smtClean="0"/>
               <a:pPr/>
-              <a:t>9/26/2010</a:t>
+              <a:t>9/27/2010</a:t>
             </a:fld>
             <a:endParaRPr lang="en-US"/>
           </a:p>
@@ -2212,7 +2214,7 @@
             <a:fld id="{1D8BD707-D9CF-40AE-B4C6-C98DA3205C09}" type="datetimeFigureOut">
               <a:rPr lang="en-US" smtClean="0"/>
               <a:pPr/>
-              <a:t>9/26/2010</a:t>
+              <a:t>9/27/2010</a:t>
             </a:fld>
             <a:endParaRPr lang="en-US"/>
           </a:p>
@@ -2304,7 +2306,7 @@
             <a:fld id="{1D8BD707-D9CF-40AE-B4C6-C98DA3205C09}" type="datetimeFigureOut">
               <a:rPr lang="en-US" smtClean="0"/>
               <a:pPr/>
-              <a:t>9/26/2010</a:t>
+              <a:t>9/27/2010</a:t>
             </a:fld>
             <a:endParaRPr lang="en-US"/>
           </a:p>
@@ -2578,7 +2580,7 @@
             <a:fld id="{1D8BD707-D9CF-40AE-B4C6-C98DA3205C09}" type="datetimeFigureOut">
               <a:rPr lang="en-US" smtClean="0"/>
               <a:pPr/>
-              <a:t>9/26/2010</a:t>
+              <a:t>9/27/2010</a:t>
             </a:fld>
             <a:endParaRPr lang="en-US"/>
           </a:p>
@@ -2828,7 +2830,7 @@
             <a:fld id="{1D8BD707-D9CF-40AE-B4C6-C98DA3205C09}" type="datetimeFigureOut">
               <a:rPr lang="en-US" smtClean="0"/>
               <a:pPr/>
-              <a:t>9/26/2010</a:t>
+              <a:t>9/27/2010</a:t>
             </a:fld>
             <a:endParaRPr lang="en-US"/>
           </a:p>
@@ -3038,7 +3040,7 @@
             <a:fld id="{1D8BD707-D9CF-40AE-B4C6-C98DA3205C09}" type="datetimeFigureOut">
               <a:rPr lang="en-US" smtClean="0"/>
               <a:pPr/>
-              <a:t>9/26/2010</a:t>
+              <a:t>9/27/2010</a:t>
             </a:fld>
             <a:endParaRPr lang="en-US"/>
           </a:p>
@@ -3699,6 +3701,7 @@
           </a:bodyPr>
           <a:lstStyle/>
           <a:p>
+            <a:pPr algn="ctr"/>
             <a:r>
               <a:rPr lang="en-US" b="1" dirty="0" smtClean="0">
                 <a:latin typeface="Times New Roman" pitchFamily="18" charset="0"/>
@@ -3849,7 +3852,7 @@
                 <a:latin typeface="Times New Roman" pitchFamily="18" charset="0"/>
                 <a:cs typeface="Times New Roman" pitchFamily="18" charset="0"/>
               </a:rPr>
-              <a:t>Harvest</a:t>
+              <a:t>Fetcher</a:t>
             </a:r>
             <a:endParaRPr lang="en-US" sz="1600" dirty="0">
               <a:solidFill>
@@ -3981,7 +3984,7 @@
         </p:nvSpPr>
         <p:spPr>
           <a:xfrm>
-            <a:off x="5029200" y="3657600"/>
+            <a:off x="4953000" y="3657600"/>
             <a:ext cx="1447800" cy="533400"/>
           </a:xfrm>
           <a:prstGeom prst="roundRect">
@@ -4037,7 +4040,7 @@
         </p:nvSpPr>
         <p:spPr>
           <a:xfrm>
-            <a:off x="6781800" y="3657600"/>
+            <a:off x="6705600" y="3657600"/>
             <a:ext cx="914400" cy="533400"/>
           </a:xfrm>
           <a:prstGeom prst="roundRect">
@@ -4073,7 +4076,7 @@
                 <a:latin typeface="Times New Roman" pitchFamily="18" charset="0"/>
                 <a:cs typeface="Times New Roman" pitchFamily="18" charset="0"/>
               </a:rPr>
-              <a:t>Harvest</a:t>
+              <a:t>Fetcher</a:t>
             </a:r>
             <a:endParaRPr lang="en-US" sz="1600" dirty="0">
               <a:solidFill>
@@ -4201,7 +4204,7 @@
         </p:nvSpPr>
         <p:spPr>
           <a:xfrm>
-            <a:off x="5486400" y="2514600"/>
+            <a:off x="5562600" y="2514600"/>
             <a:ext cx="304800" cy="1143000"/>
           </a:xfrm>
           <a:prstGeom prst="downArrow">
@@ -4315,8 +4318,8 @@
         </p:nvSpPr>
         <p:spPr>
           <a:xfrm>
-            <a:off x="2819400" y="2057400"/>
-            <a:ext cx="1447800" cy="533400"/>
+            <a:off x="2590800" y="1981200"/>
+            <a:ext cx="1676400" cy="533400"/>
           </a:xfrm>
           <a:prstGeom prst="roundRect">
             <a:avLst/>
@@ -4351,7 +4354,17 @@
                 <a:latin typeface="Times New Roman" pitchFamily="18" charset="0"/>
                 <a:cs typeface="Times New Roman" pitchFamily="18" charset="0"/>
               </a:rPr>
-              <a:t>Query</a:t>
+              <a:t>Database m</a:t>
+            </a:r>
+            <a:r>
+              <a:rPr lang="en-US" sz="1500" dirty="0" smtClean="0">
+                <a:solidFill>
+                  <a:schemeClr val="tx1"/>
+                </a:solidFill>
+                <a:latin typeface="Times New Roman" pitchFamily="18" charset="0"/>
+                <a:cs typeface="Times New Roman" pitchFamily="18" charset="0"/>
+              </a:rPr>
+              <a:t>anager</a:t>
             </a:r>
             <a:endParaRPr lang="en-US" sz="1500" dirty="0">
               <a:solidFill>
@@ -4485,8 +4498,8 @@
         </p:nvSpPr>
         <p:spPr>
           <a:xfrm>
-            <a:off x="2743200" y="3657600"/>
-            <a:ext cx="1447800" cy="533400"/>
+            <a:off x="2590800" y="3657600"/>
+            <a:ext cx="1676400" cy="533400"/>
           </a:xfrm>
           <a:prstGeom prst="roundRect">
             <a:avLst/>
@@ -4521,7 +4534,7 @@
                 <a:latin typeface="Times New Roman" pitchFamily="18" charset="0"/>
                 <a:cs typeface="Times New Roman" pitchFamily="18" charset="0"/>
               </a:rPr>
-              <a:t>Query</a:t>
+              <a:t>Database manager</a:t>
             </a:r>
             <a:endParaRPr lang="en-US" sz="1500" dirty="0">
               <a:solidFill>
@@ -4541,8 +4554,8 @@
         </p:nvSpPr>
         <p:spPr>
           <a:xfrm>
-            <a:off x="3276600" y="2590800"/>
-            <a:ext cx="304800" cy="1066800"/>
+            <a:off x="3276600" y="2514600"/>
+            <a:ext cx="304800" cy="1143000"/>
           </a:xfrm>
           <a:prstGeom prst="downArrow">
             <a:avLst/>

</xml_diff>